<commit_message>
Improve Segmentation Annotator documentation
</commit_message>
<xml_diff>
--- a/documentation/microglia-morphometry.pptx
+++ b/documentation/microglia-morphometry.pptx
@@ -8,6 +8,9 @@
     <p:sldId id="256" r:id="rId2"/>
     <p:sldId id="257" r:id="rId3"/>
     <p:sldId id="258" r:id="rId4"/>
+    <p:sldId id="260" r:id="rId5"/>
+    <p:sldId id="259" r:id="rId6"/>
+    <p:sldId id="261" r:id="rId7"/>
   </p:sldIdLst>
   <p:sldSz cx="12192000" cy="6858000"/>
   <p:notesSz cx="6858000" cy="9144000"/>
@@ -263,7 +266,7 @@
           <a:p>
             <a:fld id="{F7B7CB3C-EEC7-5648-A427-3300C2441272}" type="datetimeFigureOut">
               <a:rPr lang="de-DE" smtClean="0"/>
-              <a:t>08.04.22</a:t>
+              <a:t>12.04.22</a:t>
             </a:fld>
             <a:endParaRPr lang="de-DE"/>
           </a:p>
@@ -463,7 +466,7 @@
           <a:p>
             <a:fld id="{F7B7CB3C-EEC7-5648-A427-3300C2441272}" type="datetimeFigureOut">
               <a:rPr lang="de-DE" smtClean="0"/>
-              <a:t>08.04.22</a:t>
+              <a:t>12.04.22</a:t>
             </a:fld>
             <a:endParaRPr lang="de-DE"/>
           </a:p>
@@ -673,7 +676,7 @@
           <a:p>
             <a:fld id="{F7B7CB3C-EEC7-5648-A427-3300C2441272}" type="datetimeFigureOut">
               <a:rPr lang="de-DE" smtClean="0"/>
-              <a:t>08.04.22</a:t>
+              <a:t>12.04.22</a:t>
             </a:fld>
             <a:endParaRPr lang="de-DE"/>
           </a:p>
@@ -873,7 +876,7 @@
           <a:p>
             <a:fld id="{F7B7CB3C-EEC7-5648-A427-3300C2441272}" type="datetimeFigureOut">
               <a:rPr lang="de-DE" smtClean="0"/>
-              <a:t>08.04.22</a:t>
+              <a:t>12.04.22</a:t>
             </a:fld>
             <a:endParaRPr lang="de-DE"/>
           </a:p>
@@ -1149,7 +1152,7 @@
           <a:p>
             <a:fld id="{F7B7CB3C-EEC7-5648-A427-3300C2441272}" type="datetimeFigureOut">
               <a:rPr lang="de-DE" smtClean="0"/>
-              <a:t>08.04.22</a:t>
+              <a:t>12.04.22</a:t>
             </a:fld>
             <a:endParaRPr lang="de-DE"/>
           </a:p>
@@ -1417,7 +1420,7 @@
           <a:p>
             <a:fld id="{F7B7CB3C-EEC7-5648-A427-3300C2441272}" type="datetimeFigureOut">
               <a:rPr lang="de-DE" smtClean="0"/>
-              <a:t>08.04.22</a:t>
+              <a:t>12.04.22</a:t>
             </a:fld>
             <a:endParaRPr lang="de-DE"/>
           </a:p>
@@ -1832,7 +1835,7 @@
           <a:p>
             <a:fld id="{F7B7CB3C-EEC7-5648-A427-3300C2441272}" type="datetimeFigureOut">
               <a:rPr lang="de-DE" smtClean="0"/>
-              <a:t>08.04.22</a:t>
+              <a:t>12.04.22</a:t>
             </a:fld>
             <a:endParaRPr lang="de-DE"/>
           </a:p>
@@ -1974,7 +1977,7 @@
           <a:p>
             <a:fld id="{F7B7CB3C-EEC7-5648-A427-3300C2441272}" type="datetimeFigureOut">
               <a:rPr lang="de-DE" smtClean="0"/>
-              <a:t>08.04.22</a:t>
+              <a:t>12.04.22</a:t>
             </a:fld>
             <a:endParaRPr lang="de-DE"/>
           </a:p>
@@ -2087,7 +2090,7 @@
           <a:p>
             <a:fld id="{F7B7CB3C-EEC7-5648-A427-3300C2441272}" type="datetimeFigureOut">
               <a:rPr lang="de-DE" smtClean="0"/>
-              <a:t>08.04.22</a:t>
+              <a:t>12.04.22</a:t>
             </a:fld>
             <a:endParaRPr lang="de-DE"/>
           </a:p>
@@ -2400,7 +2403,7 @@
           <a:p>
             <a:fld id="{F7B7CB3C-EEC7-5648-A427-3300C2441272}" type="datetimeFigureOut">
               <a:rPr lang="de-DE" smtClean="0"/>
-              <a:t>08.04.22</a:t>
+              <a:t>12.04.22</a:t>
             </a:fld>
             <a:endParaRPr lang="de-DE"/>
           </a:p>
@@ -2689,7 +2692,7 @@
           <a:p>
             <a:fld id="{F7B7CB3C-EEC7-5648-A427-3300C2441272}" type="datetimeFigureOut">
               <a:rPr lang="de-DE" smtClean="0"/>
-              <a:t>08.04.22</a:t>
+              <a:t>12.04.22</a:t>
             </a:fld>
             <a:endParaRPr lang="de-DE"/>
           </a:p>
@@ -2932,7 +2935,7 @@
           <a:p>
             <a:fld id="{F7B7CB3C-EEC7-5648-A427-3300C2441272}" type="datetimeFigureOut">
               <a:rPr lang="de-DE" smtClean="0"/>
-              <a:t>08.04.22</a:t>
+              <a:t>12.04.22</a:t>
             </a:fld>
             <a:endParaRPr lang="de-DE"/>
           </a:p>
@@ -3602,91 +3605,347 @@
         </p:nvPicPr>
         <p:blipFill rotWithShape="1">
           <a:blip r:embed="rId2"/>
-          <a:srcRect r="7277"/>
+          <a:srcRect l="5033" t="6068" r="7277"/>
           <a:stretch/>
         </p:blipFill>
         <p:spPr>
           <a:xfrm rot="5400000">
-            <a:off x="2969209" y="-1920264"/>
-            <a:ext cx="5443008" cy="10013787"/>
+            <a:off x="3702535" y="298939"/>
+            <a:ext cx="3813263" cy="6968067"/>
           </a:xfrm>
           <a:prstGeom prst="rect">
             <a:avLst/>
           </a:prstGeom>
         </p:spPr>
       </p:pic>
-      <p:sp>
-        <p:nvSpPr>
-          <p:cNvPr id="3" name="TextBox 2">
-            <a:extLst>
-              <a:ext uri="{FF2B5EF4-FFF2-40B4-BE49-F238E27FC236}">
-                <a16:creationId xmlns:a16="http://schemas.microsoft.com/office/drawing/2014/main" id="{134AC597-A4F4-FF4B-A2B5-D65AC38562FC}"/>
-              </a:ext>
-            </a:extLst>
-          </p:cNvPr>
-          <p:cNvSpPr txBox="1"/>
+    </p:spTree>
+    <p:extLst>
+      <p:ext uri="{BB962C8B-B14F-4D97-AF65-F5344CB8AC3E}">
+        <p14:creationId xmlns:p14="http://schemas.microsoft.com/office/powerpoint/2010/main" val="410661996"/>
+      </p:ext>
+    </p:extLst>
+  </p:cSld>
+  <p:clrMapOvr>
+    <a:masterClrMapping/>
+  </p:clrMapOvr>
+</p:sld>
+</file>
+
+<file path=ppt/slides/slide4.xml><?xml version="1.0" encoding="utf-8"?>
+<p:sld xmlns:a="http://schemas.openxmlformats.org/drawingml/2006/main" xmlns:r="http://schemas.openxmlformats.org/officeDocument/2006/relationships" xmlns:p="http://schemas.openxmlformats.org/presentationml/2006/main">
+  <p:cSld>
+    <p:spTree>
+      <p:nvGrpSpPr>
+        <p:cNvPr id="1" name=""/>
+        <p:cNvGrpSpPr/>
+        <p:nvPr/>
+      </p:nvGrpSpPr>
+      <p:grpSpPr>
+        <a:xfrm>
+          <a:off x="0" y="0"/>
+          <a:ext cx="0" cy="0"/>
+          <a:chOff x="0" y="0"/>
+          <a:chExt cx="0" cy="0"/>
+        </a:xfrm>
+      </p:grpSpPr>
+      <p:pic>
+        <p:nvPicPr>
+          <p:cNvPr id="5" name="Picture 4">
+            <a:extLst>
+              <a:ext uri="{FF2B5EF4-FFF2-40B4-BE49-F238E27FC236}">
+                <a16:creationId xmlns:a16="http://schemas.microsoft.com/office/drawing/2014/main" id="{40459B3D-FF1D-2E44-9975-816B660ED721}"/>
+              </a:ext>
+            </a:extLst>
+          </p:cNvPr>
+          <p:cNvPicPr>
+            <a:picLocks noChangeAspect="1"/>
+          </p:cNvPicPr>
           <p:nvPr/>
-        </p:nvSpPr>
+        </p:nvPicPr>
+        <p:blipFill>
+          <a:blip r:embed="rId2"/>
+          <a:stretch>
+            <a:fillRect/>
+          </a:stretch>
+        </p:blipFill>
         <p:spPr>
           <a:xfrm>
-            <a:off x="4329215" y="1010973"/>
-            <a:ext cx="5923416" cy="769441"/>
+            <a:off x="6593883" y="2035530"/>
+            <a:ext cx="3454400" cy="3678011"/>
           </a:xfrm>
           <a:prstGeom prst="rect">
             <a:avLst/>
           </a:prstGeom>
-          <a:noFill/>
         </p:spPr>
-        <p:txBody>
-          <a:bodyPr wrap="none" rtlCol="0">
+      </p:pic>
+      <p:sp>
+        <p:nvSpPr>
+          <p:cNvPr id="6" name="Rectangle 5">
+            <a:extLst>
+              <a:ext uri="{FF2B5EF4-FFF2-40B4-BE49-F238E27FC236}">
+                <a16:creationId xmlns:a16="http://schemas.microsoft.com/office/drawing/2014/main" id="{A5D753A3-3369-234F-B89C-F13C0802E3CF}"/>
+              </a:ext>
+            </a:extLst>
+          </p:cNvPr>
+          <p:cNvSpPr/>
+          <p:nvPr/>
+        </p:nvSpPr>
+        <p:spPr>
+          <a:xfrm>
+            <a:off x="411925" y="2394636"/>
+            <a:ext cx="5613400" cy="338554"/>
+          </a:xfrm>
+          <a:prstGeom prst="rect">
+            <a:avLst/>
+          </a:prstGeom>
+        </p:spPr>
+        <p:txBody>
+          <a:bodyPr wrap="square">
             <a:spAutoFit/>
           </a:bodyPr>
           <a:lstStyle/>
           <a:p>
             <a:r>
-              <a:rPr lang="de-DE" sz="4400" dirty="0" err="1">
-                <a:solidFill>
-                  <a:schemeClr val="bg1"/>
-                </a:solidFill>
-                <a:latin typeface="Helvetica" pitchFamily="2" charset="0"/>
-                <a:ea typeface="Gungsuh" panose="02030600000101010101" pitchFamily="18" charset="-127"/>
-              </a:rPr>
-              <a:t>Microglia</a:t>
-            </a:r>
-            <a:r>
-              <a:rPr lang="de-DE" sz="4400" dirty="0">
-                <a:solidFill>
-                  <a:schemeClr val="bg1"/>
-                </a:solidFill>
-                <a:latin typeface="Helvetica" pitchFamily="2" charset="0"/>
-                <a:ea typeface="Gungsuh" panose="02030600000101010101" pitchFamily="18" charset="-127"/>
-              </a:rPr>
-              <a:t> </a:t>
-            </a:r>
-            <a:r>
-              <a:rPr lang="de-DE" sz="4400" dirty="0" err="1">
-                <a:solidFill>
-                  <a:schemeClr val="bg1"/>
-                </a:solidFill>
-                <a:latin typeface="Helvetica" pitchFamily="2" charset="0"/>
-                <a:ea typeface="Gungsuh" panose="02030600000101010101" pitchFamily="18" charset="-127"/>
-              </a:rPr>
-              <a:t>Morphometry</a:t>
-            </a:r>
-            <a:endParaRPr lang="de-DE" sz="4400" dirty="0">
-              <a:solidFill>
-                <a:schemeClr val="bg1"/>
-              </a:solidFill>
-              <a:latin typeface="Helvetica" pitchFamily="2" charset="0"/>
-              <a:ea typeface="Gungsuh" panose="02030600000101010101" pitchFamily="18" charset="-127"/>
-            </a:endParaRPr>
-          </a:p>
-        </p:txBody>
-      </p:sp>
+              <a:rPr lang="de-DE" sz="1600" dirty="0" err="1"/>
+              <a:t>Plugins</a:t>
+            </a:r>
+            <a:r>
+              <a:rPr lang="de-DE" sz="1600" dirty="0"/>
+              <a:t> › Segmentation › </a:t>
+            </a:r>
+            <a:r>
+              <a:rPr lang="de-DE" sz="1600" dirty="0" err="1"/>
+              <a:t>Annotator</a:t>
+            </a:r>
+            <a:r>
+              <a:rPr lang="de-DE" sz="1600" dirty="0"/>
+              <a:t> › Open Dataset </a:t>
+            </a:r>
+            <a:r>
+              <a:rPr lang="de-DE" sz="1600" dirty="0" err="1"/>
+              <a:t>from</a:t>
+            </a:r>
+            <a:r>
+              <a:rPr lang="de-DE" sz="1600" dirty="0"/>
+              <a:t> Table...</a:t>
+            </a:r>
+          </a:p>
+        </p:txBody>
+      </p:sp>
+      <p:pic>
+        <p:nvPicPr>
+          <p:cNvPr id="7" name="Picture 6">
+            <a:extLst>
+              <a:ext uri="{FF2B5EF4-FFF2-40B4-BE49-F238E27FC236}">
+                <a16:creationId xmlns:a16="http://schemas.microsoft.com/office/drawing/2014/main" id="{971B3F7F-7C8F-A74F-AFF2-EAD79311ED64}"/>
+              </a:ext>
+            </a:extLst>
+          </p:cNvPr>
+          <p:cNvPicPr>
+            <a:picLocks noChangeAspect="1"/>
+          </p:cNvPicPr>
+          <p:nvPr/>
+        </p:nvPicPr>
+        <p:blipFill>
+          <a:blip r:embed="rId3"/>
+          <a:stretch>
+            <a:fillRect/>
+          </a:stretch>
+        </p:blipFill>
+        <p:spPr>
+          <a:xfrm>
+            <a:off x="411925" y="3315372"/>
+            <a:ext cx="5543550" cy="2010805"/>
+          </a:xfrm>
+          <a:prstGeom prst="rect">
+            <a:avLst/>
+          </a:prstGeom>
+        </p:spPr>
+      </p:pic>
     </p:spTree>
     <p:extLst>
       <p:ext uri="{BB962C8B-B14F-4D97-AF65-F5344CB8AC3E}">
-        <p14:creationId xmlns:p14="http://schemas.microsoft.com/office/powerpoint/2010/main" val="410661996"/>
+        <p14:creationId xmlns:p14="http://schemas.microsoft.com/office/powerpoint/2010/main" val="2150570802"/>
+      </p:ext>
+    </p:extLst>
+  </p:cSld>
+  <p:clrMapOvr>
+    <a:masterClrMapping/>
+  </p:clrMapOvr>
+</p:sld>
+</file>
+
+<file path=ppt/slides/slide5.xml><?xml version="1.0" encoding="utf-8"?>
+<p:sld xmlns:a="http://schemas.openxmlformats.org/drawingml/2006/main" xmlns:r="http://schemas.openxmlformats.org/officeDocument/2006/relationships" xmlns:p="http://schemas.openxmlformats.org/presentationml/2006/main">
+  <p:cSld>
+    <p:spTree>
+      <p:nvGrpSpPr>
+        <p:cNvPr id="1" name=""/>
+        <p:cNvGrpSpPr/>
+        <p:nvPr/>
+      </p:nvGrpSpPr>
+      <p:grpSpPr>
+        <a:xfrm>
+          <a:off x="0" y="0"/>
+          <a:ext cx="0" cy="0"/>
+          <a:chOff x="0" y="0"/>
+          <a:chExt cx="0" cy="0"/>
+        </a:xfrm>
+      </p:grpSpPr>
+      <p:pic>
+        <p:nvPicPr>
+          <p:cNvPr id="2" name="Picture 1">
+            <a:extLst>
+              <a:ext uri="{FF2B5EF4-FFF2-40B4-BE49-F238E27FC236}">
+                <a16:creationId xmlns:a16="http://schemas.microsoft.com/office/drawing/2014/main" id="{AA6300B9-C3E3-7446-81FE-781733022825}"/>
+              </a:ext>
+            </a:extLst>
+          </p:cNvPr>
+          <p:cNvPicPr>
+            <a:picLocks noChangeAspect="1"/>
+          </p:cNvPicPr>
+          <p:nvPr/>
+        </p:nvPicPr>
+        <p:blipFill>
+          <a:blip r:embed="rId2"/>
+          <a:stretch>
+            <a:fillRect/>
+          </a:stretch>
+        </p:blipFill>
+        <p:spPr>
+          <a:xfrm>
+            <a:off x="1337733" y="1027756"/>
+            <a:ext cx="4779179" cy="5034378"/>
+          </a:xfrm>
+          <a:prstGeom prst="rect">
+            <a:avLst/>
+          </a:prstGeom>
+        </p:spPr>
+      </p:pic>
+      <p:pic>
+        <p:nvPicPr>
+          <p:cNvPr id="3" name="Picture 2">
+            <a:extLst>
+              <a:ext uri="{FF2B5EF4-FFF2-40B4-BE49-F238E27FC236}">
+                <a16:creationId xmlns:a16="http://schemas.microsoft.com/office/drawing/2014/main" id="{6F2D81A1-0F99-D740-89F6-8C86C759186A}"/>
+              </a:ext>
+            </a:extLst>
+          </p:cNvPr>
+          <p:cNvPicPr>
+            <a:picLocks noChangeAspect="1"/>
+          </p:cNvPicPr>
+          <p:nvPr/>
+        </p:nvPicPr>
+        <p:blipFill>
+          <a:blip r:embed="rId3"/>
+          <a:stretch>
+            <a:fillRect/>
+          </a:stretch>
+        </p:blipFill>
+        <p:spPr>
+          <a:xfrm>
+            <a:off x="6449725" y="1027756"/>
+            <a:ext cx="4737767" cy="5034378"/>
+          </a:xfrm>
+          <a:prstGeom prst="rect">
+            <a:avLst/>
+          </a:prstGeom>
+        </p:spPr>
+      </p:pic>
+    </p:spTree>
+    <p:extLst>
+      <p:ext uri="{BB962C8B-B14F-4D97-AF65-F5344CB8AC3E}">
+        <p14:creationId xmlns:p14="http://schemas.microsoft.com/office/powerpoint/2010/main" val="1166351221"/>
+      </p:ext>
+    </p:extLst>
+  </p:cSld>
+  <p:clrMapOvr>
+    <a:masterClrMapping/>
+  </p:clrMapOvr>
+</p:sld>
+</file>
+
+<file path=ppt/slides/slide6.xml><?xml version="1.0" encoding="utf-8"?>
+<p:sld xmlns:a="http://schemas.openxmlformats.org/drawingml/2006/main" xmlns:r="http://schemas.openxmlformats.org/officeDocument/2006/relationships" xmlns:p="http://schemas.openxmlformats.org/presentationml/2006/main">
+  <p:cSld>
+    <p:spTree>
+      <p:nvGrpSpPr>
+        <p:cNvPr id="1" name=""/>
+        <p:cNvGrpSpPr/>
+        <p:nvPr/>
+      </p:nvGrpSpPr>
+      <p:grpSpPr>
+        <a:xfrm>
+          <a:off x="0" y="0"/>
+          <a:ext cx="0" cy="0"/>
+          <a:chOff x="0" y="0"/>
+          <a:chExt cx="0" cy="0"/>
+        </a:xfrm>
+      </p:grpSpPr>
+      <p:pic>
+        <p:nvPicPr>
+          <p:cNvPr id="4" name="Picture 3">
+            <a:extLst>
+              <a:ext uri="{FF2B5EF4-FFF2-40B4-BE49-F238E27FC236}">
+                <a16:creationId xmlns:a16="http://schemas.microsoft.com/office/drawing/2014/main" id="{583E0082-7742-184F-A08A-25A708E4297D}"/>
+              </a:ext>
+            </a:extLst>
+          </p:cNvPr>
+          <p:cNvPicPr>
+            <a:picLocks noChangeAspect="1"/>
+          </p:cNvPicPr>
+          <p:nvPr/>
+        </p:nvPicPr>
+        <p:blipFill>
+          <a:blip r:embed="rId2"/>
+          <a:stretch>
+            <a:fillRect/>
+          </a:stretch>
+        </p:blipFill>
+        <p:spPr>
+          <a:xfrm>
+            <a:off x="1320778" y="391886"/>
+            <a:ext cx="4672803" cy="4922322"/>
+          </a:xfrm>
+          <a:prstGeom prst="rect">
+            <a:avLst/>
+          </a:prstGeom>
+        </p:spPr>
+      </p:pic>
+      <p:pic>
+        <p:nvPicPr>
+          <p:cNvPr id="5" name="Picture 4">
+            <a:extLst>
+              <a:ext uri="{FF2B5EF4-FFF2-40B4-BE49-F238E27FC236}">
+                <a16:creationId xmlns:a16="http://schemas.microsoft.com/office/drawing/2014/main" id="{84FF7BC5-87F7-D04C-BCDB-C14E37F417DA}"/>
+              </a:ext>
+            </a:extLst>
+          </p:cNvPr>
+          <p:cNvPicPr>
+            <a:picLocks noChangeAspect="1"/>
+          </p:cNvPicPr>
+          <p:nvPr/>
+        </p:nvPicPr>
+        <p:blipFill>
+          <a:blip r:embed="rId3"/>
+          <a:stretch>
+            <a:fillRect/>
+          </a:stretch>
+        </p:blipFill>
+        <p:spPr>
+          <a:xfrm>
+            <a:off x="6295302" y="391886"/>
+            <a:ext cx="4632313" cy="4922322"/>
+          </a:xfrm>
+          <a:prstGeom prst="rect">
+            <a:avLst/>
+          </a:prstGeom>
+        </p:spPr>
+      </p:pic>
+    </p:spTree>
+    <p:extLst>
+      <p:ext uri="{BB962C8B-B14F-4D97-AF65-F5344CB8AC3E}">
+        <p14:creationId xmlns:p14="http://schemas.microsoft.com/office/powerpoint/2010/main" val="3553543348"/>
       </p:ext>
     </p:extLst>
   </p:cSld>

</xml_diff>